<commit_message>
final version of SSC2017 presentation
</commit_message>
<xml_diff>
--- a/presentations/ssc2017/SSC 2017.pptx
+++ b/presentations/ssc2017/SSC 2017.pptx
@@ -248,6 +248,11 @@
       </a:defRPr>
     </a:lvl9pPr>
   </p:defaultTextStyle>
+  <p:extLst>
+    <p:ext uri="{EFAFB233-063F-42B5-8137-9DF3F51BA10A}">
+      <p15:sldGuideLst xmlns:p15="http://schemas.microsoft.com/office/powerpoint/2012/main"/>
+    </p:ext>
+  </p:extLst>
 </p:presentation>
 </file>
 
@@ -8064,7 +8069,7 @@
             </a:pPr>
             <a:r>
               <a:rPr lang="en"/>
-              <a:t>The Art Of Iterating</a:t>
+              <a:t>The Art Of Iterating:</a:t>
             </a:r>
           </a:p>
           <a:p>
@@ -8075,7 +8080,7 @@
               <a:buNone/>
             </a:pPr>
             <a:r>
-              <a:rPr lang="en"/>
+              <a:rPr lang="en" dirty="0"/>
               <a:t>Update-Strategies in ABS</a:t>
             </a:r>
           </a:p>

</xml_diff>